<commit_message>
modified plotting, generated new figures
</commit_message>
<xml_diff>
--- a/remake_figures_new/post_processing_figs_normal.pptx
+++ b/remake_figures_new/post_processing_figs_normal.pptx
@@ -10,7 +10,6 @@
     <p:sldId id="258" r:id="rId4"/>
     <p:sldId id="259" r:id="rId5"/>
     <p:sldId id="260" r:id="rId6"/>
-    <p:sldId id="261" r:id="rId7"/>
   </p:sldIdLst>
   <p:sldSz cx="9144000" cy="6858000" type="screen4x3"/>
   <p:notesSz cx="6858000" cy="9144000"/>
@@ -248,7 +247,7 @@
           <a:p>
             <a:fld id="{9EA75ECA-0918-3546-879C-2D9AD65E7906}" type="datetimeFigureOut">
               <a:rPr lang="en-US" smtClean="0"/>
-              <a:t>6/20/22</a:t>
+              <a:t>6/28/22</a:t>
             </a:fld>
             <a:endParaRPr lang="en-US"/>
           </a:p>
@@ -418,7 +417,7 @@
           <a:p>
             <a:fld id="{9EA75ECA-0918-3546-879C-2D9AD65E7906}" type="datetimeFigureOut">
               <a:rPr lang="en-US" smtClean="0"/>
-              <a:t>6/20/22</a:t>
+              <a:t>6/28/22</a:t>
             </a:fld>
             <a:endParaRPr lang="en-US"/>
           </a:p>
@@ -598,7 +597,7 @@
           <a:p>
             <a:fld id="{9EA75ECA-0918-3546-879C-2D9AD65E7906}" type="datetimeFigureOut">
               <a:rPr lang="en-US" smtClean="0"/>
-              <a:t>6/20/22</a:t>
+              <a:t>6/28/22</a:t>
             </a:fld>
             <a:endParaRPr lang="en-US"/>
           </a:p>
@@ -768,7 +767,7 @@
           <a:p>
             <a:fld id="{9EA75ECA-0918-3546-879C-2D9AD65E7906}" type="datetimeFigureOut">
               <a:rPr lang="en-US" smtClean="0"/>
-              <a:t>6/20/22</a:t>
+              <a:t>6/28/22</a:t>
             </a:fld>
             <a:endParaRPr lang="en-US"/>
           </a:p>
@@ -1012,7 +1011,7 @@
           <a:p>
             <a:fld id="{9EA75ECA-0918-3546-879C-2D9AD65E7906}" type="datetimeFigureOut">
               <a:rPr lang="en-US" smtClean="0"/>
-              <a:t>6/20/22</a:t>
+              <a:t>6/28/22</a:t>
             </a:fld>
             <a:endParaRPr lang="en-US"/>
           </a:p>
@@ -1244,7 +1243,7 @@
           <a:p>
             <a:fld id="{9EA75ECA-0918-3546-879C-2D9AD65E7906}" type="datetimeFigureOut">
               <a:rPr lang="en-US" smtClean="0"/>
-              <a:t>6/20/22</a:t>
+              <a:t>6/28/22</a:t>
             </a:fld>
             <a:endParaRPr lang="en-US"/>
           </a:p>
@@ -1611,7 +1610,7 @@
           <a:p>
             <a:fld id="{9EA75ECA-0918-3546-879C-2D9AD65E7906}" type="datetimeFigureOut">
               <a:rPr lang="en-US" smtClean="0"/>
-              <a:t>6/20/22</a:t>
+              <a:t>6/28/22</a:t>
             </a:fld>
             <a:endParaRPr lang="en-US"/>
           </a:p>
@@ -1729,7 +1728,7 @@
           <a:p>
             <a:fld id="{9EA75ECA-0918-3546-879C-2D9AD65E7906}" type="datetimeFigureOut">
               <a:rPr lang="en-US" smtClean="0"/>
-              <a:t>6/20/22</a:t>
+              <a:t>6/28/22</a:t>
             </a:fld>
             <a:endParaRPr lang="en-US"/>
           </a:p>
@@ -1824,7 +1823,7 @@
           <a:p>
             <a:fld id="{9EA75ECA-0918-3546-879C-2D9AD65E7906}" type="datetimeFigureOut">
               <a:rPr lang="en-US" smtClean="0"/>
-              <a:t>6/20/22</a:t>
+              <a:t>6/28/22</a:t>
             </a:fld>
             <a:endParaRPr lang="en-US"/>
           </a:p>
@@ -2101,7 +2100,7 @@
           <a:p>
             <a:fld id="{9EA75ECA-0918-3546-879C-2D9AD65E7906}" type="datetimeFigureOut">
               <a:rPr lang="en-US" smtClean="0"/>
-              <a:t>6/20/22</a:t>
+              <a:t>6/28/22</a:t>
             </a:fld>
             <a:endParaRPr lang="en-US"/>
           </a:p>
@@ -2358,7 +2357,7 @@
           <a:p>
             <a:fld id="{9EA75ECA-0918-3546-879C-2D9AD65E7906}" type="datetimeFigureOut">
               <a:rPr lang="en-US" smtClean="0"/>
-              <a:t>6/20/22</a:t>
+              <a:t>6/28/22</a:t>
             </a:fld>
             <a:endParaRPr lang="en-US"/>
           </a:p>
@@ -2571,7 +2570,7 @@
           <a:p>
             <a:fld id="{9EA75ECA-0918-3546-879C-2D9AD65E7906}" type="datetimeFigureOut">
               <a:rPr lang="en-US" smtClean="0"/>
-              <a:t>6/20/22</a:t>
+              <a:t>6/28/22</a:t>
             </a:fld>
             <a:endParaRPr lang="en-US"/>
           </a:p>
@@ -2960,7 +2959,7 @@
 </file>
 
 <file path=ppt/slides/slide1.xml><?xml version="1.0" encoding="utf-8"?>
-<p:sld xmlns:a="http://schemas.openxmlformats.org/drawingml/2006/main" xmlns:r="http://schemas.openxmlformats.org/officeDocument/2006/relationships" xmlns:p="http://schemas.openxmlformats.org/presentationml/2006/main">
+<p:sld xmlns:a="http://schemas.openxmlformats.org/drawingml/2006/main" xmlns:r="http://schemas.openxmlformats.org/officeDocument/2006/relationships" xmlns:p="http://schemas.openxmlformats.org/presentationml/2006/main" show="0">
   <p:cSld>
     <p:spTree>
       <p:nvGrpSpPr>
@@ -2978,6 +2977,35 @@
       </p:grpSpPr>
       <p:pic>
         <p:nvPicPr>
+          <p:cNvPr id="19" name="Picture 18">
+            <a:extLst>
+              <a:ext uri="{FF2B5EF4-FFF2-40B4-BE49-F238E27FC236}">
+                <a16:creationId xmlns:a16="http://schemas.microsoft.com/office/drawing/2014/main" id="{851A07A2-1252-5A3A-8DF3-CA24161A639D}"/>
+              </a:ext>
+            </a:extLst>
+          </p:cNvPr>
+          <p:cNvPicPr>
+            <a:picLocks noChangeAspect="1"/>
+          </p:cNvPicPr>
+          <p:nvPr/>
+        </p:nvPicPr>
+        <p:blipFill rotWithShape="1">
+          <a:blip r:embed="rId2"/>
+          <a:srcRect t="10280"/>
+          <a:stretch/>
+        </p:blipFill>
+        <p:spPr>
+          <a:xfrm>
+            <a:off x="62475" y="23515"/>
+            <a:ext cx="8175394" cy="6810970"/>
+          </a:xfrm>
+          <a:prstGeom prst="rect">
+            <a:avLst/>
+          </a:prstGeom>
+        </p:spPr>
+      </p:pic>
+      <p:pic>
+        <p:nvPicPr>
           <p:cNvPr id="10" name="Picture 9" descr="Chart, bubble chart&#10;&#10;Description automatically generated">
             <a:extLst>
               <a:ext uri="{FF2B5EF4-FFF2-40B4-BE49-F238E27FC236}">
@@ -2991,14 +3019,14 @@
           <p:nvPr/>
         </p:nvPicPr>
         <p:blipFill rotWithShape="1">
-          <a:blip r:embed="rId2"/>
-          <a:srcRect l="26911" t="26369" r="23141" b="23126"/>
+          <a:blip r:embed="rId3"/>
+          <a:srcRect l="28296" t="24492" r="28574" b="25003"/>
           <a:stretch/>
         </p:blipFill>
         <p:spPr>
           <a:xfrm>
-            <a:off x="6747250" y="2627112"/>
-            <a:ext cx="2296838" cy="1190375"/>
+            <a:off x="7388584" y="2816421"/>
+            <a:ext cx="1579352" cy="947923"/>
           </a:xfrm>
           <a:prstGeom prst="rect">
             <a:avLst/>
@@ -3020,14 +3048,14 @@
           <p:nvPr/>
         </p:nvPicPr>
         <p:blipFill rotWithShape="1">
-          <a:blip r:embed="rId3"/>
+          <a:blip r:embed="rId4"/>
           <a:srcRect l="31494" t="-2766" r="29592" b="22766"/>
           <a:stretch/>
         </p:blipFill>
         <p:spPr>
           <a:xfrm>
-            <a:off x="6906275" y="194059"/>
-            <a:ext cx="1647056" cy="1735443"/>
+            <a:off x="7515243" y="352129"/>
+            <a:ext cx="1326034" cy="1397194"/>
           </a:xfrm>
           <a:prstGeom prst="rect">
             <a:avLst/>
@@ -3036,10 +3064,10 @@
       </p:pic>
       <p:pic>
         <p:nvPicPr>
-          <p:cNvPr id="12" name="Picture 11" descr="Chart, bubble chart&#10;&#10;Description automatically generated">
+          <p:cNvPr id="6" name="Picture 5" descr="A picture containing pool table, pool ball, table, ball&#10;&#10;Description automatically generated">
             <a:extLst>
               <a:ext uri="{FF2B5EF4-FFF2-40B4-BE49-F238E27FC236}">
-                <a16:creationId xmlns:a16="http://schemas.microsoft.com/office/drawing/2014/main" id="{31A7BF74-6714-B749-BC4F-961AF8C16391}"/>
+                <a16:creationId xmlns:a16="http://schemas.microsoft.com/office/drawing/2014/main" id="{6D1DDD1B-1190-2D42-86A7-60A720C80ADC}"/>
               </a:ext>
             </a:extLst>
           </p:cNvPr>
@@ -3049,14 +3077,16 @@
           <p:nvPr/>
         </p:nvPicPr>
         <p:blipFill rotWithShape="1">
-          <a:blip r:embed="rId4"/>
-          <a:srcRect l="23906" t="26240" r="18633" b="31414"/>
+          <a:blip r:embed="rId5">
+            <a:alphaModFix/>
+          </a:blip>
+          <a:srcRect l="34148" t="33757" r="52647" b="48514"/>
           <a:stretch/>
         </p:blipFill>
         <p:spPr>
           <a:xfrm>
-            <a:off x="6722852" y="4628687"/>
-            <a:ext cx="2345634" cy="886003"/>
+            <a:off x="7602309" y="5046970"/>
+            <a:ext cx="1151902" cy="791449"/>
           </a:xfrm>
           <a:prstGeom prst="rect">
             <a:avLst/>
@@ -3065,10 +3095,10 @@
       </p:pic>
       <p:pic>
         <p:nvPicPr>
-          <p:cNvPr id="3" name="Picture 2">
+          <p:cNvPr id="21" name="Picture 20">
             <a:extLst>
               <a:ext uri="{FF2B5EF4-FFF2-40B4-BE49-F238E27FC236}">
-                <a16:creationId xmlns:a16="http://schemas.microsoft.com/office/drawing/2014/main" id="{5936F526-EAFD-AA67-EF15-8AC06847C1C9}"/>
+                <a16:creationId xmlns:a16="http://schemas.microsoft.com/office/drawing/2014/main" id="{639CFFD1-AD75-F28E-15A7-D95D09FAE884}"/>
               </a:ext>
             </a:extLst>
           </p:cNvPr>
@@ -3077,16 +3107,15 @@
           </p:cNvPicPr>
           <p:nvPr/>
         </p:nvPicPr>
-        <p:blipFill>
-          <a:blip r:embed="rId5"/>
-          <a:stretch>
-            <a:fillRect/>
-          </a:stretch>
+        <p:blipFill rotWithShape="1">
+          <a:blip r:embed="rId6"/>
+          <a:srcRect l="1445" t="10697" b="10178"/>
+          <a:stretch/>
         </p:blipFill>
         <p:spPr>
           <a:xfrm>
-            <a:off x="75514" y="-555431"/>
-            <a:ext cx="7413431" cy="7413431"/>
+            <a:off x="6121589" y="23515"/>
+            <a:ext cx="3022411" cy="492340"/>
           </a:xfrm>
           <a:prstGeom prst="rect">
             <a:avLst/>
@@ -3125,6 +3154,35 @@
       </p:grpSpPr>
       <p:pic>
         <p:nvPicPr>
+          <p:cNvPr id="10" name="Picture 9">
+            <a:extLst>
+              <a:ext uri="{FF2B5EF4-FFF2-40B4-BE49-F238E27FC236}">
+                <a16:creationId xmlns:a16="http://schemas.microsoft.com/office/drawing/2014/main" id="{28C5BDF0-4956-8F32-BD9D-F5F6933D3DD1}"/>
+              </a:ext>
+            </a:extLst>
+          </p:cNvPr>
+          <p:cNvPicPr>
+            <a:picLocks noChangeAspect="1"/>
+          </p:cNvPicPr>
+          <p:nvPr/>
+        </p:nvPicPr>
+        <p:blipFill rotWithShape="1">
+          <a:blip r:embed="rId2"/>
+          <a:srcRect l="935" b="1903"/>
+          <a:stretch/>
+        </p:blipFill>
+        <p:spPr>
+          <a:xfrm>
+            <a:off x="0" y="516953"/>
+            <a:ext cx="9198889" cy="6072691"/>
+          </a:xfrm>
+          <a:prstGeom prst="rect">
+            <a:avLst/>
+          </a:prstGeom>
+        </p:spPr>
+      </p:pic>
+      <p:pic>
+        <p:nvPicPr>
           <p:cNvPr id="9" name="Picture 8" descr="Chart, bubble chart&#10;&#10;Description automatically generated">
             <a:extLst>
               <a:ext uri="{FF2B5EF4-FFF2-40B4-BE49-F238E27FC236}">
@@ -3138,14 +3196,14 @@
           <p:nvPr/>
         </p:nvPicPr>
         <p:blipFill rotWithShape="1">
-          <a:blip r:embed="rId2"/>
+          <a:blip r:embed="rId3"/>
           <a:srcRect l="26451" t="2389" r="23661" b="17374"/>
           <a:stretch/>
         </p:blipFill>
         <p:spPr>
           <a:xfrm>
-            <a:off x="524845" y="396076"/>
-            <a:ext cx="2201319" cy="1814601"/>
+            <a:off x="1278339" y="1122887"/>
+            <a:ext cx="1643917" cy="1355121"/>
           </a:xfrm>
           <a:prstGeom prst="rect">
             <a:avLst/>
@@ -3167,14 +3225,14 @@
           <p:nvPr/>
         </p:nvPicPr>
         <p:blipFill rotWithShape="1">
-          <a:blip r:embed="rId3"/>
+          <a:blip r:embed="rId4"/>
           <a:srcRect l="23867" t="19068" r="20884" b="15329"/>
           <a:stretch/>
         </p:blipFill>
         <p:spPr>
           <a:xfrm>
-            <a:off x="4810540" y="675979"/>
-            <a:ext cx="2632864" cy="1597451"/>
+            <a:off x="5042902" y="1277912"/>
+            <a:ext cx="2205229" cy="1337990"/>
           </a:xfrm>
           <a:prstGeom prst="rect">
             <a:avLst/>
@@ -3196,14 +3254,14 @@
           <p:nvPr/>
         </p:nvPicPr>
         <p:blipFill rotWithShape="1">
-          <a:blip r:embed="rId4"/>
+          <a:blip r:embed="rId5"/>
           <a:srcRect l="28285" r="27967" b="11113"/>
           <a:stretch/>
         </p:blipFill>
         <p:spPr>
           <a:xfrm>
-            <a:off x="7231636" y="307637"/>
-            <a:ext cx="1912364" cy="1991474"/>
+            <a:off x="7251892" y="839088"/>
+            <a:ext cx="1834624" cy="1910518"/>
           </a:xfrm>
           <a:prstGeom prst="rect">
             <a:avLst/>
@@ -3225,14 +3283,14 @@
           <p:nvPr/>
         </p:nvPicPr>
         <p:blipFill rotWithShape="1">
-          <a:blip r:embed="rId5"/>
+          <a:blip r:embed="rId6"/>
           <a:srcRect l="29268" t="2284" r="25756" b="-2284"/>
           <a:stretch/>
         </p:blipFill>
         <p:spPr>
           <a:xfrm>
-            <a:off x="2953109" y="399625"/>
-            <a:ext cx="1811997" cy="2064941"/>
+            <a:off x="3383716" y="1154393"/>
+            <a:ext cx="1401772" cy="1597451"/>
           </a:xfrm>
           <a:prstGeom prst="rect">
             <a:avLst/>
@@ -3241,10 +3299,10 @@
       </p:pic>
       <p:pic>
         <p:nvPicPr>
-          <p:cNvPr id="6" name="Picture 5">
+          <p:cNvPr id="15" name="Picture 14">
             <a:extLst>
               <a:ext uri="{FF2B5EF4-FFF2-40B4-BE49-F238E27FC236}">
-                <a16:creationId xmlns:a16="http://schemas.microsoft.com/office/drawing/2014/main" id="{1D59D0B2-1C58-2709-13FB-E1ABC7146C73}"/>
+                <a16:creationId xmlns:a16="http://schemas.microsoft.com/office/drawing/2014/main" id="{672F46DD-38E9-A344-25F9-48FAD40AA222}"/>
               </a:ext>
             </a:extLst>
           </p:cNvPr>
@@ -3253,16 +3311,15 @@
           </p:cNvPicPr>
           <p:nvPr/>
         </p:nvPicPr>
-        <p:blipFill>
-          <a:blip r:embed="rId6"/>
-          <a:stretch>
-            <a:fillRect/>
-          </a:stretch>
+        <p:blipFill rotWithShape="1">
+          <a:blip r:embed="rId7"/>
+          <a:srcRect l="1445" t="10697" b="10178"/>
+          <a:stretch/>
         </p:blipFill>
         <p:spPr>
           <a:xfrm>
-            <a:off x="-25143" y="2273428"/>
-            <a:ext cx="9169143" cy="4584572"/>
+            <a:off x="5561075" y="447786"/>
+            <a:ext cx="3582925" cy="583646"/>
           </a:xfrm>
           <a:prstGeom prst="rect">
             <a:avLst/>
@@ -3283,7 +3340,7 @@
 </file>
 
 <file path=ppt/slides/slide3.xml><?xml version="1.0" encoding="utf-8"?>
-<p:sld xmlns:a="http://schemas.openxmlformats.org/drawingml/2006/main" xmlns:r="http://schemas.openxmlformats.org/officeDocument/2006/relationships" xmlns:p="http://schemas.openxmlformats.org/presentationml/2006/main" show="0">
+<p:sld xmlns:a="http://schemas.openxmlformats.org/drawingml/2006/main" xmlns:r="http://schemas.openxmlformats.org/officeDocument/2006/relationships" xmlns:p="http://schemas.openxmlformats.org/presentationml/2006/main">
   <p:cSld>
     <p:spTree>
       <p:nvGrpSpPr>
@@ -3301,10 +3358,10 @@
       </p:grpSpPr>
       <p:pic>
         <p:nvPicPr>
-          <p:cNvPr id="25" name="Picture 24">
+          <p:cNvPr id="21" name="Picture 20">
             <a:extLst>
               <a:ext uri="{FF2B5EF4-FFF2-40B4-BE49-F238E27FC236}">
-                <a16:creationId xmlns:a16="http://schemas.microsoft.com/office/drawing/2014/main" id="{1DD4DF22-2738-A747-B6A4-706B78740ECE}"/>
+                <a16:creationId xmlns:a16="http://schemas.microsoft.com/office/drawing/2014/main" id="{9B773E84-A4C4-5133-651A-32093F238FD3}"/>
               </a:ext>
             </a:extLst>
           </p:cNvPr>
@@ -3313,16 +3370,15 @@
           </p:cNvPicPr>
           <p:nvPr/>
         </p:nvPicPr>
-        <p:blipFill>
+        <p:blipFill rotWithShape="1">
           <a:blip r:embed="rId2"/>
-          <a:stretch>
-            <a:fillRect/>
-          </a:stretch>
+          <a:srcRect l="1057" t="-2322" r="823" b="2322"/>
+          <a:stretch/>
         </p:blipFill>
         <p:spPr>
           <a:xfrm>
-            <a:off x="0" y="726977"/>
-            <a:ext cx="9144000" cy="6096000"/>
+            <a:off x="0" y="408924"/>
+            <a:ext cx="9140654" cy="6210537"/>
           </a:xfrm>
           <a:prstGeom prst="rect">
             <a:avLst/>
@@ -3361,8 +3417,8 @@
         </p:blipFill>
         <p:spPr>
           <a:xfrm>
-            <a:off x="4049487" y="-269459"/>
-            <a:ext cx="2516020" cy="1708740"/>
+            <a:off x="4310744" y="-159427"/>
+            <a:ext cx="2055980" cy="1396306"/>
           </a:xfrm>
           <a:prstGeom prst="rect">
             <a:avLst/>
@@ -3371,10 +3427,10 @@
       </p:pic>
       <p:pic>
         <p:nvPicPr>
-          <p:cNvPr id="19" name="Picture 18">
+          <p:cNvPr id="23" name="Picture 22">
             <a:extLst>
               <a:ext uri="{FF2B5EF4-FFF2-40B4-BE49-F238E27FC236}">
-                <a16:creationId xmlns:a16="http://schemas.microsoft.com/office/drawing/2014/main" id="{4ACC43A2-6A47-CD4F-B62A-D4C459DA6F3A}"/>
+                <a16:creationId xmlns:a16="http://schemas.microsoft.com/office/drawing/2014/main" id="{A7B044A5-21A8-D36E-D9DF-7437CA2E6B4B}"/>
               </a:ext>
             </a:extLst>
           </p:cNvPr>
@@ -3383,15 +3439,16 @@
           </p:cNvPicPr>
           <p:nvPr/>
         </p:nvPicPr>
-        <p:blipFill rotWithShape="1">
+        <p:blipFill>
           <a:blip r:embed="rId4"/>
-          <a:srcRect l="68198" t="1269" r="762" b="73490"/>
-          <a:stretch/>
+          <a:stretch>
+            <a:fillRect/>
+          </a:stretch>
         </p:blipFill>
         <p:spPr>
           <a:xfrm>
-            <a:off x="6305668" y="35023"/>
-            <a:ext cx="2838332" cy="1538672"/>
+            <a:off x="6238783" y="-59636"/>
+            <a:ext cx="2901871" cy="1547665"/>
           </a:xfrm>
           <a:prstGeom prst="rect">
             <a:avLst/>
@@ -3430,10 +3487,39 @@
       </p:grpSpPr>
       <p:pic>
         <p:nvPicPr>
-          <p:cNvPr id="7" name="Picture 6">
+          <p:cNvPr id="14" name="Picture 13">
             <a:extLst>
               <a:ext uri="{FF2B5EF4-FFF2-40B4-BE49-F238E27FC236}">
-                <a16:creationId xmlns:a16="http://schemas.microsoft.com/office/drawing/2014/main" id="{C8FC164B-D237-F044-8B83-3BE26BAD8E62}"/>
+                <a16:creationId xmlns:a16="http://schemas.microsoft.com/office/drawing/2014/main" id="{A2288365-C0F3-7E0A-0BE4-292BA1972874}"/>
+              </a:ext>
+            </a:extLst>
+          </p:cNvPr>
+          <p:cNvPicPr>
+            <a:picLocks noChangeAspect="1"/>
+          </p:cNvPicPr>
+          <p:nvPr/>
+        </p:nvPicPr>
+        <p:blipFill rotWithShape="1">
+          <a:blip r:embed="rId2"/>
+          <a:srcRect l="931" t="-653" r="742" b="2462"/>
+          <a:stretch/>
+        </p:blipFill>
+        <p:spPr>
+          <a:xfrm>
+            <a:off x="-5486" y="431642"/>
+            <a:ext cx="9149486" cy="6091267"/>
+          </a:xfrm>
+          <a:prstGeom prst="rect">
+            <a:avLst/>
+          </a:prstGeom>
+        </p:spPr>
+      </p:pic>
+      <p:pic>
+        <p:nvPicPr>
+          <p:cNvPr id="18" name="Picture 17">
+            <a:extLst>
+              <a:ext uri="{FF2B5EF4-FFF2-40B4-BE49-F238E27FC236}">
+                <a16:creationId xmlns:a16="http://schemas.microsoft.com/office/drawing/2014/main" id="{338706B1-9A04-B336-E374-4F1A693D0016}"/>
               </a:ext>
             </a:extLst>
           </p:cNvPr>
@@ -3443,15 +3529,15 @@
           <p:nvPr/>
         </p:nvPicPr>
         <p:blipFill>
-          <a:blip r:embed="rId2"/>
+          <a:blip r:embed="rId3"/>
           <a:stretch>
             <a:fillRect/>
           </a:stretch>
         </p:blipFill>
         <p:spPr>
           <a:xfrm>
-            <a:off x="0" y="381000"/>
-            <a:ext cx="9144000" cy="6096000"/>
+            <a:off x="4988298" y="335091"/>
+            <a:ext cx="2963005" cy="2005041"/>
           </a:xfrm>
           <a:prstGeom prst="rect">
             <a:avLst/>
@@ -3472,7 +3558,7 @@
 </file>
 
 <file path=ppt/slides/slide5.xml><?xml version="1.0" encoding="utf-8"?>
-<p:sld xmlns:a="http://schemas.openxmlformats.org/drawingml/2006/main" xmlns:r="http://schemas.openxmlformats.org/officeDocument/2006/relationships" xmlns:p="http://schemas.openxmlformats.org/presentationml/2006/main" show="0">
+<p:sld xmlns:a="http://schemas.openxmlformats.org/drawingml/2006/main" xmlns:r="http://schemas.openxmlformats.org/officeDocument/2006/relationships" xmlns:p="http://schemas.openxmlformats.org/presentationml/2006/main">
   <p:cSld>
     <p:spTree>
       <p:nvGrpSpPr>
@@ -3490,272 +3576,10 @@
       </p:grpSpPr>
       <p:pic>
         <p:nvPicPr>
-          <p:cNvPr id="10" name="Picture 9" descr="Chart, bubble chart&#10;&#10;Description automatically generated">
+          <p:cNvPr id="5" name="Picture 4">
             <a:extLst>
               <a:ext uri="{FF2B5EF4-FFF2-40B4-BE49-F238E27FC236}">
-                <a16:creationId xmlns:a16="http://schemas.microsoft.com/office/drawing/2014/main" id="{480C5FF3-0E2C-1B41-9B41-35CAB819AE48}"/>
-              </a:ext>
-            </a:extLst>
-          </p:cNvPr>
-          <p:cNvPicPr>
-            <a:picLocks noChangeAspect="1"/>
-          </p:cNvPicPr>
-          <p:nvPr/>
-        </p:nvPicPr>
-        <p:blipFill rotWithShape="1">
-          <a:blip r:embed="rId2"/>
-          <a:srcRect l="26911" t="26369" r="23141" b="23126"/>
-          <a:stretch/>
-        </p:blipFill>
-        <p:spPr>
-          <a:xfrm>
-            <a:off x="6747250" y="2627112"/>
-            <a:ext cx="2296838" cy="1190375"/>
-          </a:xfrm>
-          <a:prstGeom prst="rect">
-            <a:avLst/>
-          </a:prstGeom>
-        </p:spPr>
-      </p:pic>
-      <p:pic>
-        <p:nvPicPr>
-          <p:cNvPr id="8" name="Picture 7" descr="A picture containing chart&#10;&#10;Description automatically generated">
-            <a:extLst>
-              <a:ext uri="{FF2B5EF4-FFF2-40B4-BE49-F238E27FC236}">
-                <a16:creationId xmlns:a16="http://schemas.microsoft.com/office/drawing/2014/main" id="{1BC0307D-417B-8D44-A93A-245B7CD96D73}"/>
-              </a:ext>
-            </a:extLst>
-          </p:cNvPr>
-          <p:cNvPicPr>
-            <a:picLocks noChangeAspect="1"/>
-          </p:cNvPicPr>
-          <p:nvPr/>
-        </p:nvPicPr>
-        <p:blipFill rotWithShape="1">
-          <a:blip r:embed="rId3"/>
-          <a:srcRect l="31494" t="-2766" r="29592" b="22766"/>
-          <a:stretch/>
-        </p:blipFill>
-        <p:spPr>
-          <a:xfrm>
-            <a:off x="6906275" y="194059"/>
-            <a:ext cx="1647056" cy="1735443"/>
-          </a:xfrm>
-          <a:prstGeom prst="rect">
-            <a:avLst/>
-          </a:prstGeom>
-        </p:spPr>
-      </p:pic>
-      <p:pic>
-        <p:nvPicPr>
-          <p:cNvPr id="12" name="Picture 11" descr="Chart, bubble chart&#10;&#10;Description automatically generated">
-            <a:extLst>
-              <a:ext uri="{FF2B5EF4-FFF2-40B4-BE49-F238E27FC236}">
-                <a16:creationId xmlns:a16="http://schemas.microsoft.com/office/drawing/2014/main" id="{31A7BF74-6714-B749-BC4F-961AF8C16391}"/>
-              </a:ext>
-            </a:extLst>
-          </p:cNvPr>
-          <p:cNvPicPr>
-            <a:picLocks noChangeAspect="1"/>
-          </p:cNvPicPr>
-          <p:nvPr/>
-        </p:nvPicPr>
-        <p:blipFill rotWithShape="1">
-          <a:blip r:embed="rId4"/>
-          <a:srcRect l="23906" t="26240" r="18633" b="31414"/>
-          <a:stretch/>
-        </p:blipFill>
-        <p:spPr>
-          <a:xfrm>
-            <a:off x="6722852" y="4827470"/>
-            <a:ext cx="2345634" cy="886003"/>
-          </a:xfrm>
-          <a:prstGeom prst="rect">
-            <a:avLst/>
-          </a:prstGeom>
-        </p:spPr>
-      </p:pic>
-      <p:pic>
-        <p:nvPicPr>
-          <p:cNvPr id="31" name="Picture 30">
-            <a:extLst>
-              <a:ext uri="{FF2B5EF4-FFF2-40B4-BE49-F238E27FC236}">
-                <a16:creationId xmlns:a16="http://schemas.microsoft.com/office/drawing/2014/main" id="{6CE7E9B5-6CB9-C5EF-6645-2FD4086C7C97}"/>
-              </a:ext>
-            </a:extLst>
-          </p:cNvPr>
-          <p:cNvPicPr>
-            <a:picLocks noChangeAspect="1"/>
-          </p:cNvPicPr>
-          <p:nvPr/>
-        </p:nvPicPr>
-        <p:blipFill rotWithShape="1">
-          <a:blip r:embed="rId5"/>
-          <a:srcRect t="7785"/>
-          <a:stretch/>
-        </p:blipFill>
-        <p:spPr>
-          <a:xfrm>
-            <a:off x="99914" y="12991"/>
-            <a:ext cx="7431631" cy="6853103"/>
-          </a:xfrm>
-          <a:prstGeom prst="rect">
-            <a:avLst/>
-          </a:prstGeom>
-        </p:spPr>
-      </p:pic>
-    </p:spTree>
-    <p:extLst>
-      <p:ext uri="{BB962C8B-B14F-4D97-AF65-F5344CB8AC3E}">
-        <p14:creationId xmlns:p14="http://schemas.microsoft.com/office/powerpoint/2010/main" val="2794796581"/>
-      </p:ext>
-    </p:extLst>
-  </p:cSld>
-  <p:clrMapOvr>
-    <a:masterClrMapping/>
-  </p:clrMapOvr>
-</p:sld>
-</file>
-
-<file path=ppt/slides/slide6.xml><?xml version="1.0" encoding="utf-8"?>
-<p:sld xmlns:a="http://schemas.openxmlformats.org/drawingml/2006/main" xmlns:r="http://schemas.openxmlformats.org/officeDocument/2006/relationships" xmlns:p="http://schemas.openxmlformats.org/presentationml/2006/main" show="0">
-  <p:cSld>
-    <p:spTree>
-      <p:nvGrpSpPr>
-        <p:cNvPr id="1" name=""/>
-        <p:cNvGrpSpPr/>
-        <p:nvPr/>
-      </p:nvGrpSpPr>
-      <p:grpSpPr>
-        <a:xfrm>
-          <a:off x="0" y="0"/>
-          <a:ext cx="0" cy="0"/>
-          <a:chOff x="0" y="0"/>
-          <a:chExt cx="0" cy="0"/>
-        </a:xfrm>
-      </p:grpSpPr>
-      <p:pic>
-        <p:nvPicPr>
-          <p:cNvPr id="9" name="Picture 8" descr="Chart, bubble chart&#10;&#10;Description automatically generated">
-            <a:extLst>
-              <a:ext uri="{FF2B5EF4-FFF2-40B4-BE49-F238E27FC236}">
-                <a16:creationId xmlns:a16="http://schemas.microsoft.com/office/drawing/2014/main" id="{80599372-D058-3347-B857-8DE647572488}"/>
-              </a:ext>
-            </a:extLst>
-          </p:cNvPr>
-          <p:cNvPicPr>
-            <a:picLocks noChangeAspect="1"/>
-          </p:cNvPicPr>
-          <p:nvPr/>
-        </p:nvPicPr>
-        <p:blipFill rotWithShape="1">
-          <a:blip r:embed="rId2"/>
-          <a:srcRect l="26451" t="2389" r="23661" b="17374"/>
-          <a:stretch/>
-        </p:blipFill>
-        <p:spPr>
-          <a:xfrm>
-            <a:off x="524845" y="396076"/>
-            <a:ext cx="2201319" cy="1814601"/>
-          </a:xfrm>
-          <a:prstGeom prst="rect">
-            <a:avLst/>
-          </a:prstGeom>
-        </p:spPr>
-      </p:pic>
-      <p:pic>
-        <p:nvPicPr>
-          <p:cNvPr id="7" name="Picture 6" descr="Chart, bubble chart&#10;&#10;Description automatically generated">
-            <a:extLst>
-              <a:ext uri="{FF2B5EF4-FFF2-40B4-BE49-F238E27FC236}">
-                <a16:creationId xmlns:a16="http://schemas.microsoft.com/office/drawing/2014/main" id="{E68DFDFE-074C-BA4C-A362-D80CA248A15A}"/>
-              </a:ext>
-            </a:extLst>
-          </p:cNvPr>
-          <p:cNvPicPr>
-            <a:picLocks noChangeAspect="1"/>
-          </p:cNvPicPr>
-          <p:nvPr/>
-        </p:nvPicPr>
-        <p:blipFill rotWithShape="1">
-          <a:blip r:embed="rId3"/>
-          <a:srcRect l="23867" t="19068" r="20884" b="15329"/>
-          <a:stretch/>
-        </p:blipFill>
-        <p:spPr>
-          <a:xfrm>
-            <a:off x="4810540" y="675979"/>
-            <a:ext cx="2632864" cy="1597451"/>
-          </a:xfrm>
-          <a:prstGeom prst="rect">
-            <a:avLst/>
-          </a:prstGeom>
-        </p:spPr>
-      </p:pic>
-      <p:pic>
-        <p:nvPicPr>
-          <p:cNvPr id="11" name="Picture 10" descr="Chart, bubble chart&#10;&#10;Description automatically generated">
-            <a:extLst>
-              <a:ext uri="{FF2B5EF4-FFF2-40B4-BE49-F238E27FC236}">
-                <a16:creationId xmlns:a16="http://schemas.microsoft.com/office/drawing/2014/main" id="{27D504D7-7CFC-C74B-8202-E0FB8414D9F8}"/>
-              </a:ext>
-            </a:extLst>
-          </p:cNvPr>
-          <p:cNvPicPr>
-            <a:picLocks noChangeAspect="1"/>
-          </p:cNvPicPr>
-          <p:nvPr/>
-        </p:nvPicPr>
-        <p:blipFill rotWithShape="1">
-          <a:blip r:embed="rId4"/>
-          <a:srcRect l="28285" r="27967" b="11113"/>
-          <a:stretch/>
-        </p:blipFill>
-        <p:spPr>
-          <a:xfrm>
-            <a:off x="7231636" y="307637"/>
-            <a:ext cx="1912364" cy="1991474"/>
-          </a:xfrm>
-          <a:prstGeom prst="rect">
-            <a:avLst/>
-          </a:prstGeom>
-        </p:spPr>
-      </p:pic>
-      <p:pic>
-        <p:nvPicPr>
-          <p:cNvPr id="13" name="Picture 12" descr="Chart, bubble chart&#10;&#10;Description automatically generated">
-            <a:extLst>
-              <a:ext uri="{FF2B5EF4-FFF2-40B4-BE49-F238E27FC236}">
-                <a16:creationId xmlns:a16="http://schemas.microsoft.com/office/drawing/2014/main" id="{CBC90044-2906-E14A-8919-1F9978ED7A75}"/>
-              </a:ext>
-            </a:extLst>
-          </p:cNvPr>
-          <p:cNvPicPr>
-            <a:picLocks noChangeAspect="1"/>
-          </p:cNvPicPr>
-          <p:nvPr/>
-        </p:nvPicPr>
-        <p:blipFill rotWithShape="1">
-          <a:blip r:embed="rId5"/>
-          <a:srcRect l="29268" t="2284" r="25756" b="-2284"/>
-          <a:stretch/>
-        </p:blipFill>
-        <p:spPr>
-          <a:xfrm>
-            <a:off x="2953109" y="399625"/>
-            <a:ext cx="1811997" cy="2064941"/>
-          </a:xfrm>
-          <a:prstGeom prst="rect">
-            <a:avLst/>
-          </a:prstGeom>
-        </p:spPr>
-      </p:pic>
-      <p:pic>
-        <p:nvPicPr>
-          <p:cNvPr id="6" name="Picture 5">
-            <a:extLst>
-              <a:ext uri="{FF2B5EF4-FFF2-40B4-BE49-F238E27FC236}">
-                <a16:creationId xmlns:a16="http://schemas.microsoft.com/office/drawing/2014/main" id="{1D59D0B2-1C58-2709-13FB-E1ABC7146C73}"/>
+                <a16:creationId xmlns:a16="http://schemas.microsoft.com/office/drawing/2014/main" id="{21FA0E14-D6C4-2599-CE6A-B5B8E68AB48C}"/>
               </a:ext>
             </a:extLst>
           </p:cNvPr>
@@ -3765,15 +3589,15 @@
           <p:nvPr/>
         </p:nvPicPr>
         <p:blipFill>
-          <a:blip r:embed="rId6"/>
+          <a:blip r:embed="rId2"/>
           <a:stretch>
             <a:fillRect/>
           </a:stretch>
         </p:blipFill>
         <p:spPr>
           <a:xfrm>
-            <a:off x="-25143" y="2273428"/>
-            <a:ext cx="9169143" cy="4584572"/>
+            <a:off x="99392" y="79513"/>
+            <a:ext cx="9144000" cy="6858000"/>
           </a:xfrm>
           <a:prstGeom prst="rect">
             <a:avLst/>
@@ -3783,7 +3607,7 @@
     </p:spTree>
     <p:extLst>
       <p:ext uri="{BB962C8B-B14F-4D97-AF65-F5344CB8AC3E}">
-        <p14:creationId xmlns:p14="http://schemas.microsoft.com/office/powerpoint/2010/main" val="1492383188"/>
+        <p14:creationId xmlns:p14="http://schemas.microsoft.com/office/powerpoint/2010/main" val="1033231668"/>
       </p:ext>
     </p:extLst>
   </p:cSld>

</xml_diff>